<commit_message>
Version 7 Merged 4&6
</commit_message>
<xml_diff>
--- a/PowerPoint/PPT Test.pptx
+++ b/PowerPoint/PPT Test.pptx
@@ -5678,12 +5678,12 @@
           <a:lstStyle/>
           <a:p>
             <a:r>
-              <a:rPr lang="en-US" smtClean="0"/>
+              <a:rPr lang="en-US" dirty="0"/>
               <a:t>Version </a:t>
             </a:r>
             <a:r>
-              <a:rPr lang="en-US"/>
-              <a:t>6</a:t>
+              <a:rPr lang="en-US" smtClean="0"/>
+              <a:t>7 Merged 4&amp;6</a:t>
             </a:r>
             <a:endParaRPr lang="en-US" dirty="0"/>
           </a:p>

</xml_diff>

<commit_message>
Reverted to version 5
</commit_message>
<xml_diff>
--- a/PowerPoint/PPT Test.pptx
+++ b/PowerPoint/PPT Test.pptx
@@ -5678,12 +5678,12 @@
           <a:lstStyle/>
           <a:p>
             <a:r>
-              <a:rPr lang="en-US" dirty="0"/>
+              <a:rPr lang="en-US" smtClean="0"/>
               <a:t>Version </a:t>
             </a:r>
             <a:r>
-              <a:rPr lang="en-US" smtClean="0"/>
-              <a:t>7 Merged 4&amp;6</a:t>
+              <a:rPr lang="en-US"/>
+              <a:t>5</a:t>
             </a:r>
             <a:endParaRPr lang="en-US" dirty="0"/>
           </a:p>

</xml_diff>

<commit_message>
Reverted to version 2
</commit_message>
<xml_diff>
--- a/PowerPoint/PPT Test.pptx
+++ b/PowerPoint/PPT Test.pptx
@@ -5682,10 +5682,10 @@
               <a:t>Version </a:t>
             </a:r>
             <a:r>
-              <a:rPr lang="en-US"/>
-              <a:t>6</a:t>
-            </a:r>
-            <a:endParaRPr lang="en-US" dirty="0"/>
+              <a:rPr lang="en-US" smtClean="0"/>
+              <a:t>2</a:t>
+            </a:r>
+            <a:endParaRPr lang="en-US"/>
           </a:p>
         </p:txBody>
       </p:sp>

</xml_diff>

<commit_message>
Reverted to version 9
</commit_message>
<xml_diff>
--- a/PowerPoint/PPT Test.pptx
+++ b/PowerPoint/PPT Test.pptx
@@ -5682,10 +5682,10 @@
               <a:t>Version </a:t>
             </a:r>
             <a:r>
-              <a:rPr lang="en-US" smtClean="0"/>
-              <a:t>2</a:t>
-            </a:r>
-            <a:endParaRPr lang="en-US"/>
+              <a:rPr lang="en-US"/>
+              <a:t>6</a:t>
+            </a:r>
+            <a:endParaRPr lang="en-US" dirty="0"/>
           </a:p>
         </p:txBody>
       </p:sp>

</xml_diff>

<commit_message>
Reverted to version 16
</commit_message>
<xml_diff>
--- a/PowerPoint/PPT Test.pptx
+++ b/PowerPoint/PPT Test.pptx
@@ -5681,10 +5681,10 @@
           <a:p>
             <a:r>
               <a:rPr lang="en-US" smtClean="0"/>
-              <a:t>New Test</a:t>
-            </a:r>
-            <a:r>
-              <a:rPr lang="en-US" smtClean="0"/>
+              <a:t>PaTESTge</a:t>
+            </a:r>
+            <a:r>
+              <a:rPr lang="en-US" dirty="0" smtClean="0"/>
               <a:t> </a:t>
             </a:r>
             <a:r>
@@ -5760,7 +5760,11 @@
           <a:p>
             <a:r>
               <a:rPr lang="en-US"/>
-              <a:t>Pare </a:t>
+              <a:t>Pare</a:t>
+            </a:r>
+            <a:r>
+              <a:rPr lang="en-US"/>
+              <a:t> </a:t>
             </a:r>
             <a:r>
               <a:rPr lang="en-US" smtClean="0"/>

</xml_diff>